<commit_message>
Updates v2.0 of RR Protocol
account for retinal speed differences for precision + minor updates
</commit_message>
<xml_diff>
--- a/Figures/(Figure 1) Schematic of processes.pptx
+++ b/Figures/(Figure 1) Schematic of processes.pptx
@@ -271,7 +271,7 @@
           <a:p>
             <a:fld id="{D2C2D0F7-05C5-48CE-8D0B-123D6605B773}" type="datetimeFigureOut">
               <a:rPr lang="en-US" smtClean="0"/>
-              <a:t>10/20/2021</a:t>
+              <a:t>11/6/2021</a:t>
             </a:fld>
             <a:endParaRPr lang="en-US"/>
           </a:p>
@@ -469,7 +469,7 @@
           <a:p>
             <a:fld id="{D2C2D0F7-05C5-48CE-8D0B-123D6605B773}" type="datetimeFigureOut">
               <a:rPr lang="en-US" smtClean="0"/>
-              <a:t>10/20/2021</a:t>
+              <a:t>11/6/2021</a:t>
             </a:fld>
             <a:endParaRPr lang="en-US"/>
           </a:p>
@@ -677,7 +677,7 @@
           <a:p>
             <a:fld id="{D2C2D0F7-05C5-48CE-8D0B-123D6605B773}" type="datetimeFigureOut">
               <a:rPr lang="en-US" smtClean="0"/>
-              <a:t>10/20/2021</a:t>
+              <a:t>11/6/2021</a:t>
             </a:fld>
             <a:endParaRPr lang="en-US"/>
           </a:p>
@@ -875,7 +875,7 @@
           <a:p>
             <a:fld id="{D2C2D0F7-05C5-48CE-8D0B-123D6605B773}" type="datetimeFigureOut">
               <a:rPr lang="en-US" smtClean="0"/>
-              <a:t>10/20/2021</a:t>
+              <a:t>11/6/2021</a:t>
             </a:fld>
             <a:endParaRPr lang="en-US"/>
           </a:p>
@@ -1150,7 +1150,7 @@
           <a:p>
             <a:fld id="{D2C2D0F7-05C5-48CE-8D0B-123D6605B773}" type="datetimeFigureOut">
               <a:rPr lang="en-US" smtClean="0"/>
-              <a:t>10/20/2021</a:t>
+              <a:t>11/6/2021</a:t>
             </a:fld>
             <a:endParaRPr lang="en-US"/>
           </a:p>
@@ -1415,7 +1415,7 @@
           <a:p>
             <a:fld id="{D2C2D0F7-05C5-48CE-8D0B-123D6605B773}" type="datetimeFigureOut">
               <a:rPr lang="en-US" smtClean="0"/>
-              <a:t>10/20/2021</a:t>
+              <a:t>11/6/2021</a:t>
             </a:fld>
             <a:endParaRPr lang="en-US"/>
           </a:p>
@@ -1827,7 +1827,7 @@
           <a:p>
             <a:fld id="{D2C2D0F7-05C5-48CE-8D0B-123D6605B773}" type="datetimeFigureOut">
               <a:rPr lang="en-US" smtClean="0"/>
-              <a:t>10/20/2021</a:t>
+              <a:t>11/6/2021</a:t>
             </a:fld>
             <a:endParaRPr lang="en-US"/>
           </a:p>
@@ -1968,7 +1968,7 @@
           <a:p>
             <a:fld id="{D2C2D0F7-05C5-48CE-8D0B-123D6605B773}" type="datetimeFigureOut">
               <a:rPr lang="en-US" smtClean="0"/>
-              <a:t>10/20/2021</a:t>
+              <a:t>11/6/2021</a:t>
             </a:fld>
             <a:endParaRPr lang="en-US"/>
           </a:p>
@@ -2081,7 +2081,7 @@
           <a:p>
             <a:fld id="{D2C2D0F7-05C5-48CE-8D0B-123D6605B773}" type="datetimeFigureOut">
               <a:rPr lang="en-US" smtClean="0"/>
-              <a:t>10/20/2021</a:t>
+              <a:t>11/6/2021</a:t>
             </a:fld>
             <a:endParaRPr lang="en-US"/>
           </a:p>
@@ -2392,7 +2392,7 @@
           <a:p>
             <a:fld id="{D2C2D0F7-05C5-48CE-8D0B-123D6605B773}" type="datetimeFigureOut">
               <a:rPr lang="en-US" smtClean="0"/>
-              <a:t>10/20/2021</a:t>
+              <a:t>11/6/2021</a:t>
             </a:fld>
             <a:endParaRPr lang="en-US"/>
           </a:p>
@@ -2680,7 +2680,7 @@
           <a:p>
             <a:fld id="{D2C2D0F7-05C5-48CE-8D0B-123D6605B773}" type="datetimeFigureOut">
               <a:rPr lang="en-US" smtClean="0"/>
-              <a:t>10/20/2021</a:t>
+              <a:t>11/6/2021</a:t>
             </a:fld>
             <a:endParaRPr lang="en-US"/>
           </a:p>
@@ -2921,7 +2921,7 @@
           <a:p>
             <a:fld id="{D2C2D0F7-05C5-48CE-8D0B-123D6605B773}" type="datetimeFigureOut">
               <a:rPr lang="en-US" smtClean="0"/>
-              <a:t>10/20/2021</a:t>
+              <a:t>11/6/2021</a:t>
             </a:fld>
             <a:endParaRPr lang="en-US"/>
           </a:p>
@@ -3388,7 +3388,7 @@
         </p:nvSpPr>
         <p:spPr>
           <a:xfrm>
-            <a:off x="557855" y="2072353"/>
+            <a:off x="997465" y="1812595"/>
             <a:ext cx="1826397" cy="369332"/>
           </a:xfrm>
           <a:prstGeom prst="rect">
@@ -3423,7 +3423,7 @@
         </p:nvSpPr>
         <p:spPr>
           <a:xfrm>
-            <a:off x="710232" y="2987576"/>
+            <a:off x="803236" y="3367556"/>
             <a:ext cx="755335" cy="369332"/>
           </a:xfrm>
           <a:prstGeom prst="rect">
@@ -3458,7 +3458,7 @@
         </p:nvSpPr>
         <p:spPr>
           <a:xfrm>
-            <a:off x="672689" y="3822647"/>
+            <a:off x="1238107" y="3949544"/>
             <a:ext cx="1585755" cy="369332"/>
           </a:xfrm>
           <a:prstGeom prst="rect">
@@ -3603,7 +3603,7 @@
         </p:nvSpPr>
         <p:spPr>
           <a:xfrm>
-            <a:off x="6887715" y="4493497"/>
+            <a:off x="6887714" y="4078786"/>
             <a:ext cx="2708370" cy="369332"/>
           </a:xfrm>
           <a:prstGeom prst="rect">
@@ -3670,14 +3670,13 @@
           </p:cNvPr>
           <p:cNvCxnSpPr>
             <a:cxnSpLocks/>
-            <a:stCxn id="28" idx="3"/>
           </p:cNvCxnSpPr>
           <p:nvPr/>
         </p:nvCxnSpPr>
         <p:spPr>
           <a:xfrm>
-            <a:off x="2384252" y="2257019"/>
-            <a:ext cx="439610" cy="498018"/>
+            <a:off x="2762751" y="2111791"/>
+            <a:ext cx="273401" cy="602218"/>
           </a:xfrm>
           <a:prstGeom prst="straightConnector1">
             <a:avLst/>
@@ -3716,14 +3715,13 @@
           <p:cNvCxnSpPr>
             <a:cxnSpLocks/>
             <a:stCxn id="29" idx="3"/>
-            <a:endCxn id="2" idx="1"/>
           </p:cNvCxnSpPr>
           <p:nvPr/>
         </p:nvCxnSpPr>
         <p:spPr>
           <a:xfrm flipV="1">
-            <a:off x="1465567" y="3153162"/>
-            <a:ext cx="1358295" cy="19080"/>
+            <a:off x="1558571" y="3343305"/>
+            <a:ext cx="1159312" cy="208917"/>
           </a:xfrm>
           <a:prstGeom prst="straightConnector1">
             <a:avLst/>
@@ -3761,14 +3759,13 @@
           </p:cNvPr>
           <p:cNvCxnSpPr>
             <a:cxnSpLocks/>
-            <a:stCxn id="30" idx="3"/>
           </p:cNvCxnSpPr>
           <p:nvPr/>
         </p:nvCxnSpPr>
         <p:spPr>
           <a:xfrm flipV="1">
-            <a:off x="2258444" y="3495408"/>
-            <a:ext cx="565418" cy="511905"/>
+            <a:off x="2747550" y="3476327"/>
+            <a:ext cx="297174" cy="531377"/>
           </a:xfrm>
           <a:prstGeom prst="straightConnector1">
             <a:avLst/>
@@ -3848,13 +3845,15 @@
               </a:ext>
             </a:extLst>
           </p:cNvPr>
-          <p:cNvCxnSpPr/>
+          <p:cNvCxnSpPr>
+            <a:cxnSpLocks/>
+          </p:cNvCxnSpPr>
           <p:nvPr/>
         </p:nvCxnSpPr>
         <p:spPr>
           <a:xfrm>
             <a:off x="8241900" y="3190924"/>
-            <a:ext cx="0" cy="1189428"/>
+            <a:ext cx="0" cy="902904"/>
           </a:xfrm>
           <a:prstGeom prst="straightConnector1">
             <a:avLst/>
@@ -3891,15 +3890,15 @@
             </a:extLst>
           </p:cNvPr>
           <p:cNvCxnSpPr>
-            <a:stCxn id="36" idx="2"/>
+            <a:cxnSpLocks/>
             <a:endCxn id="37" idx="0"/>
           </p:cNvCxnSpPr>
           <p:nvPr/>
         </p:nvCxnSpPr>
         <p:spPr>
           <a:xfrm>
-            <a:off x="8241900" y="4862829"/>
-            <a:ext cx="0" cy="878670"/>
+            <a:off x="8241899" y="4713575"/>
+            <a:ext cx="1" cy="1027924"/>
           </a:xfrm>
           <a:prstGeom prst="straightConnector1">
             <a:avLst/>
@@ -4093,8 +4092,8 @@
         </p:nvSpPr>
         <p:spPr>
           <a:xfrm>
-            <a:off x="3330259" y="986256"/>
-            <a:ext cx="1463414" cy="646331"/>
+            <a:off x="3712115" y="796932"/>
+            <a:ext cx="1463414" cy="1200329"/>
           </a:xfrm>
           <a:prstGeom prst="rect">
             <a:avLst/>
@@ -4130,7 +4129,7 @@
                   </a:schemeClr>
                 </a:solidFill>
               </a:rPr>
-              <a:t>Integration</a:t>
+              <a:t>Integration (via Causal Inference)</a:t>
             </a:r>
           </a:p>
         </p:txBody>
@@ -4170,6 +4169,447 @@
           </a:p>
         </p:txBody>
       </p:sp>
+      <p:sp>
+        <p:nvSpPr>
+          <p:cNvPr id="22" name="TextBox 21">
+            <a:extLst>
+              <a:ext uri="{FF2B5EF4-FFF2-40B4-BE49-F238E27FC236}">
+                <a16:creationId xmlns:a16="http://schemas.microsoft.com/office/drawing/2014/main" id="{E99153B9-55D2-4455-AC1F-8C869CE24AB5}"/>
+              </a:ext>
+            </a:extLst>
+          </p:cNvPr>
+          <p:cNvSpPr txBox="1"/>
+          <p:nvPr/>
+        </p:nvSpPr>
+        <p:spPr>
+          <a:xfrm>
+            <a:off x="622151" y="2599164"/>
+            <a:ext cx="1577804" cy="369332"/>
+          </a:xfrm>
+          <a:prstGeom prst="rect">
+            <a:avLst/>
+          </a:prstGeom>
+          <a:noFill/>
+        </p:spPr>
+        <p:txBody>
+          <a:bodyPr wrap="none" rtlCol="0">
+            <a:spAutoFit/>
+          </a:bodyPr>
+          <a:lstStyle/>
+          <a:p>
+            <a:r>
+              <a:rPr lang="de-DE" dirty="0"/>
+              <a:t>Efferent copies</a:t>
+            </a:r>
+          </a:p>
+        </p:txBody>
+      </p:sp>
+      <p:cxnSp>
+        <p:nvCxnSpPr>
+          <p:cNvPr id="24" name="Straight Arrow Connector 23">
+            <a:extLst>
+              <a:ext uri="{FF2B5EF4-FFF2-40B4-BE49-F238E27FC236}">
+                <a16:creationId xmlns:a16="http://schemas.microsoft.com/office/drawing/2014/main" id="{25365F30-2ECE-4400-BAD1-AEACB9FF362C}"/>
+              </a:ext>
+            </a:extLst>
+          </p:cNvPr>
+          <p:cNvCxnSpPr>
+            <a:cxnSpLocks/>
+          </p:cNvCxnSpPr>
+          <p:nvPr/>
+        </p:nvCxnSpPr>
+        <p:spPr>
+          <a:xfrm>
+            <a:off x="2193802" y="2799081"/>
+            <a:ext cx="595058" cy="145164"/>
+          </a:xfrm>
+          <a:prstGeom prst="straightConnector1">
+            <a:avLst/>
+          </a:prstGeom>
+          <a:ln w="38100">
+            <a:solidFill>
+              <a:srgbClr val="000000"/>
+            </a:solidFill>
+            <a:tailEnd type="triangle"/>
+          </a:ln>
+        </p:spPr>
+        <p:style>
+          <a:lnRef idx="1">
+            <a:schemeClr val="accent1"/>
+          </a:lnRef>
+          <a:fillRef idx="0">
+            <a:schemeClr val="accent1"/>
+          </a:fillRef>
+          <a:effectRef idx="0">
+            <a:schemeClr val="accent1"/>
+          </a:effectRef>
+          <a:fontRef idx="minor">
+            <a:schemeClr val="tx1"/>
+          </a:fontRef>
+        </p:style>
+      </p:cxnSp>
+      <p:grpSp>
+        <p:nvGrpSpPr>
+          <p:cNvPr id="27" name="Group 26">
+            <a:extLst>
+              <a:ext uri="{FF2B5EF4-FFF2-40B4-BE49-F238E27FC236}">
+                <a16:creationId xmlns:a16="http://schemas.microsoft.com/office/drawing/2014/main" id="{95439852-D98F-4F4B-9BA2-14DCABE7DD1C}"/>
+              </a:ext>
+            </a:extLst>
+          </p:cNvPr>
+          <p:cNvGrpSpPr/>
+          <p:nvPr/>
+        </p:nvGrpSpPr>
+        <p:grpSpPr>
+          <a:xfrm>
+            <a:off x="5940607" y="3367556"/>
+            <a:ext cx="686406" cy="369332"/>
+            <a:chOff x="5948949" y="3468560"/>
+            <a:chExt cx="686406" cy="369332"/>
+          </a:xfrm>
+        </p:grpSpPr>
+        <p:sp>
+          <p:nvSpPr>
+            <p:cNvPr id="38" name="TextBox 37">
+              <a:extLst>
+                <a:ext uri="{FF2B5EF4-FFF2-40B4-BE49-F238E27FC236}">
+                  <a16:creationId xmlns:a16="http://schemas.microsoft.com/office/drawing/2014/main" id="{7A73C3AD-14A2-4066-81FD-EF15E082D53B}"/>
+                </a:ext>
+              </a:extLst>
+            </p:cNvPr>
+            <p:cNvSpPr txBox="1"/>
+            <p:nvPr/>
+          </p:nvSpPr>
+          <p:spPr>
+            <a:xfrm>
+              <a:off x="5948949" y="3468560"/>
+              <a:ext cx="686406" cy="369332"/>
+            </a:xfrm>
+            <a:prstGeom prst="rect">
+              <a:avLst/>
+            </a:prstGeom>
+            <a:noFill/>
+          </p:spPr>
+          <p:txBody>
+            <a:bodyPr wrap="none" rtlCol="0">
+              <a:spAutoFit/>
+            </a:bodyPr>
+            <a:lstStyle/>
+            <a:p>
+              <a:r>
+                <a:rPr lang="de-DE" dirty="0">
+                  <a:solidFill>
+                    <a:srgbClr val="FFC000"/>
+                  </a:solidFill>
+                </a:rPr>
+                <a:t>noise</a:t>
+              </a:r>
+            </a:p>
+          </p:txBody>
+        </p:sp>
+        <p:cxnSp>
+          <p:nvCxnSpPr>
+            <p:cNvPr id="39" name="Straight Arrow Connector 38">
+              <a:extLst>
+                <a:ext uri="{FF2B5EF4-FFF2-40B4-BE49-F238E27FC236}">
+                  <a16:creationId xmlns:a16="http://schemas.microsoft.com/office/drawing/2014/main" id="{8389B6C6-41CF-421E-BDF9-FEFEB94F489A}"/>
+                </a:ext>
+              </a:extLst>
+            </p:cNvPr>
+            <p:cNvCxnSpPr>
+              <a:cxnSpLocks/>
+            </p:cNvCxnSpPr>
+            <p:nvPr/>
+          </p:nvCxnSpPr>
+          <p:spPr>
+            <a:xfrm flipV="1">
+              <a:off x="5958263" y="3503185"/>
+              <a:ext cx="0" cy="300082"/>
+            </a:xfrm>
+            <a:prstGeom prst="straightConnector1">
+              <a:avLst/>
+            </a:prstGeom>
+            <a:ln w="38100">
+              <a:solidFill>
+                <a:srgbClr val="FFC000"/>
+              </a:solidFill>
+              <a:tailEnd type="triangle"/>
+            </a:ln>
+          </p:spPr>
+          <p:style>
+            <a:lnRef idx="1">
+              <a:schemeClr val="accent1"/>
+            </a:lnRef>
+            <a:fillRef idx="0">
+              <a:schemeClr val="accent1"/>
+            </a:fillRef>
+            <a:effectRef idx="0">
+              <a:schemeClr val="accent1"/>
+            </a:effectRef>
+            <a:fontRef idx="minor">
+              <a:schemeClr val="tx1"/>
+            </a:fontRef>
+          </p:style>
+        </p:cxnSp>
+      </p:grpSp>
+      <p:sp>
+        <p:nvSpPr>
+          <p:cNvPr id="41" name="TextBox 40">
+            <a:extLst>
+              <a:ext uri="{FF2B5EF4-FFF2-40B4-BE49-F238E27FC236}">
+                <a16:creationId xmlns:a16="http://schemas.microsoft.com/office/drawing/2014/main" id="{97CB546B-B35F-46DF-8ED0-F2DDBFA57785}"/>
+              </a:ext>
+            </a:extLst>
+          </p:cNvPr>
+          <p:cNvSpPr txBox="1"/>
+          <p:nvPr/>
+        </p:nvSpPr>
+        <p:spPr>
+          <a:xfrm>
+            <a:off x="10064189" y="3314745"/>
+            <a:ext cx="686406" cy="369332"/>
+          </a:xfrm>
+          <a:prstGeom prst="rect">
+            <a:avLst/>
+          </a:prstGeom>
+          <a:noFill/>
+        </p:spPr>
+        <p:txBody>
+          <a:bodyPr wrap="none" rtlCol="0">
+            <a:spAutoFit/>
+          </a:bodyPr>
+          <a:lstStyle/>
+          <a:p>
+            <a:r>
+              <a:rPr lang="de-DE" dirty="0">
+                <a:solidFill>
+                  <a:schemeClr val="accent6">
+                    <a:lumMod val="60000"/>
+                    <a:lumOff val="40000"/>
+                  </a:schemeClr>
+                </a:solidFill>
+              </a:rPr>
+              <a:t>noise</a:t>
+            </a:r>
+          </a:p>
+        </p:txBody>
+      </p:sp>
+      <p:cxnSp>
+        <p:nvCxnSpPr>
+          <p:cNvPr id="42" name="Straight Arrow Connector 41">
+            <a:extLst>
+              <a:ext uri="{FF2B5EF4-FFF2-40B4-BE49-F238E27FC236}">
+                <a16:creationId xmlns:a16="http://schemas.microsoft.com/office/drawing/2014/main" id="{DFB2CBBF-F323-4F57-95C3-630A0E2D7DAC}"/>
+              </a:ext>
+            </a:extLst>
+          </p:cNvPr>
+          <p:cNvCxnSpPr>
+            <a:cxnSpLocks/>
+          </p:cNvCxnSpPr>
+          <p:nvPr/>
+        </p:nvCxnSpPr>
+        <p:spPr>
+          <a:xfrm>
+            <a:off x="10064189" y="3367556"/>
+            <a:ext cx="0" cy="316521"/>
+          </a:xfrm>
+          <a:prstGeom prst="straightConnector1">
+            <a:avLst/>
+          </a:prstGeom>
+          <a:ln w="38100">
+            <a:solidFill>
+              <a:schemeClr val="accent6">
+                <a:lumMod val="60000"/>
+                <a:lumOff val="40000"/>
+              </a:schemeClr>
+            </a:solidFill>
+            <a:tailEnd type="triangle"/>
+          </a:ln>
+        </p:spPr>
+        <p:style>
+          <a:lnRef idx="1">
+            <a:schemeClr val="accent1"/>
+          </a:lnRef>
+          <a:fillRef idx="0">
+            <a:schemeClr val="accent1"/>
+          </a:fillRef>
+          <a:effectRef idx="0">
+            <a:schemeClr val="accent1"/>
+          </a:effectRef>
+          <a:fontRef idx="minor">
+            <a:schemeClr val="tx1"/>
+          </a:fontRef>
+        </p:style>
+      </p:cxnSp>
+      <p:sp>
+        <p:nvSpPr>
+          <p:cNvPr id="45" name="TextBox 44">
+            <a:extLst>
+              <a:ext uri="{FF2B5EF4-FFF2-40B4-BE49-F238E27FC236}">
+                <a16:creationId xmlns:a16="http://schemas.microsoft.com/office/drawing/2014/main" id="{536DF5C0-42A7-4F41-88EB-C60DF1DA834F}"/>
+              </a:ext>
+            </a:extLst>
+          </p:cNvPr>
+          <p:cNvSpPr txBox="1"/>
+          <p:nvPr/>
+        </p:nvSpPr>
+        <p:spPr>
+          <a:xfrm>
+            <a:off x="7898696" y="4344243"/>
+            <a:ext cx="686406" cy="369332"/>
+          </a:xfrm>
+          <a:prstGeom prst="rect">
+            <a:avLst/>
+          </a:prstGeom>
+          <a:noFill/>
+          <a:ln>
+            <a:noFill/>
+          </a:ln>
+        </p:spPr>
+        <p:txBody>
+          <a:bodyPr wrap="none" rtlCol="0">
+            <a:spAutoFit/>
+          </a:bodyPr>
+          <a:lstStyle/>
+          <a:p>
+            <a:r>
+              <a:rPr lang="de-DE" dirty="0">
+                <a:solidFill>
+                  <a:srgbClr val="FFC000"/>
+                </a:solidFill>
+              </a:rPr>
+              <a:t>noise</a:t>
+            </a:r>
+          </a:p>
+        </p:txBody>
+      </p:sp>
+      <p:cxnSp>
+        <p:nvCxnSpPr>
+          <p:cNvPr id="46" name="Straight Arrow Connector 45">
+            <a:extLst>
+              <a:ext uri="{FF2B5EF4-FFF2-40B4-BE49-F238E27FC236}">
+                <a16:creationId xmlns:a16="http://schemas.microsoft.com/office/drawing/2014/main" id="{16656C31-1DCC-4EC6-BF69-4970A450EC5C}"/>
+              </a:ext>
+            </a:extLst>
+          </p:cNvPr>
+          <p:cNvCxnSpPr>
+            <a:cxnSpLocks/>
+          </p:cNvCxnSpPr>
+          <p:nvPr/>
+        </p:nvCxnSpPr>
+        <p:spPr>
+          <a:xfrm flipV="1">
+            <a:off x="7898696" y="4387991"/>
+            <a:ext cx="0" cy="300082"/>
+          </a:xfrm>
+          <a:prstGeom prst="straightConnector1">
+            <a:avLst/>
+          </a:prstGeom>
+          <a:ln w="38100">
+            <a:solidFill>
+              <a:srgbClr val="FFC000"/>
+            </a:solidFill>
+            <a:tailEnd type="triangle"/>
+          </a:ln>
+        </p:spPr>
+        <p:style>
+          <a:lnRef idx="1">
+            <a:schemeClr val="accent1"/>
+          </a:lnRef>
+          <a:fillRef idx="0">
+            <a:schemeClr val="accent1"/>
+          </a:fillRef>
+          <a:effectRef idx="0">
+            <a:schemeClr val="accent1"/>
+          </a:effectRef>
+          <a:fontRef idx="minor">
+            <a:schemeClr val="tx1"/>
+          </a:fontRef>
+        </p:style>
+      </p:cxnSp>
+      <p:sp>
+        <p:nvSpPr>
+          <p:cNvPr id="47" name="TextBox 46">
+            <a:extLst>
+              <a:ext uri="{FF2B5EF4-FFF2-40B4-BE49-F238E27FC236}">
+                <a16:creationId xmlns:a16="http://schemas.microsoft.com/office/drawing/2014/main" id="{89CD7BBB-176A-4E1A-B5F3-A043827A691B}"/>
+              </a:ext>
+            </a:extLst>
+          </p:cNvPr>
+          <p:cNvSpPr txBox="1"/>
+          <p:nvPr/>
+        </p:nvSpPr>
+        <p:spPr>
+          <a:xfrm>
+            <a:off x="7973019" y="6006956"/>
+            <a:ext cx="686406" cy="369332"/>
+          </a:xfrm>
+          <a:prstGeom prst="rect">
+            <a:avLst/>
+          </a:prstGeom>
+          <a:noFill/>
+        </p:spPr>
+        <p:txBody>
+          <a:bodyPr wrap="none" rtlCol="0">
+            <a:spAutoFit/>
+          </a:bodyPr>
+          <a:lstStyle/>
+          <a:p>
+            <a:r>
+              <a:rPr lang="de-DE" dirty="0">
+                <a:solidFill>
+                  <a:srgbClr val="FFC000"/>
+                </a:solidFill>
+              </a:rPr>
+              <a:t>noise</a:t>
+            </a:r>
+          </a:p>
+        </p:txBody>
+      </p:sp>
+      <p:cxnSp>
+        <p:nvCxnSpPr>
+          <p:cNvPr id="48" name="Straight Arrow Connector 47">
+            <a:extLst>
+              <a:ext uri="{FF2B5EF4-FFF2-40B4-BE49-F238E27FC236}">
+                <a16:creationId xmlns:a16="http://schemas.microsoft.com/office/drawing/2014/main" id="{7659C6FE-9D31-4A39-9B8A-95180CF2ADC4}"/>
+              </a:ext>
+            </a:extLst>
+          </p:cNvPr>
+          <p:cNvCxnSpPr>
+            <a:cxnSpLocks/>
+          </p:cNvCxnSpPr>
+          <p:nvPr/>
+        </p:nvCxnSpPr>
+        <p:spPr>
+          <a:xfrm flipV="1">
+            <a:off x="7973019" y="6050704"/>
+            <a:ext cx="0" cy="300082"/>
+          </a:xfrm>
+          <a:prstGeom prst="straightConnector1">
+            <a:avLst/>
+          </a:prstGeom>
+          <a:ln w="38100">
+            <a:solidFill>
+              <a:srgbClr val="FFC000"/>
+            </a:solidFill>
+            <a:tailEnd type="triangle"/>
+          </a:ln>
+        </p:spPr>
+        <p:style>
+          <a:lnRef idx="1">
+            <a:schemeClr val="accent1"/>
+          </a:lnRef>
+          <a:fillRef idx="0">
+            <a:schemeClr val="accent1"/>
+          </a:fillRef>
+          <a:effectRef idx="0">
+            <a:schemeClr val="accent1"/>
+          </a:effectRef>
+          <a:fontRef idx="minor">
+            <a:schemeClr val="tx1"/>
+          </a:fontRef>
+        </p:style>
+      </p:cxnSp>
     </p:spTree>
     <p:extLst>
       <p:ext uri="{BB962C8B-B14F-4D97-AF65-F5344CB8AC3E}">

</xml_diff>